<commit_message>
all-slides.pdf code.zip linear_programming.pdf linear_programming.pptx numpy.pdf numpy.pptx
</commit_message>
<xml_diff>
--- a/ipsa/slides/linear_programming.pptx
+++ b/ipsa/slides/linear_programming.pptx
@@ -139,7 +139,7 @@
 <file path=ppt/revisionInfo.xml><?xml version="1.0" encoding="utf-8"?>
 <p1510:revInfo xmlns:a="http://schemas.openxmlformats.org/drawingml/2006/main" xmlns:r="http://schemas.openxmlformats.org/officeDocument/2006/relationships" xmlns:p1510="http://schemas.microsoft.com/office/powerpoint/2015/10/main">
   <p1510:revLst>
-    <p1510:client id="{FCA54829-69E0-4900-9165-83DAEE965D83}" v="9" dt="2023-04-16T11:48:36.511"/>
+    <p1510:client id="{3182D9E5-9F75-4E9E-A6C8-86AC2F6C117C}" v="1" dt="2024-04-10T06:02:25.339"/>
   </p1510:revLst>
 </p1510:revInfo>
 </file>
@@ -758,6 +758,52 @@
       </pc:sldChg>
     </pc:docChg>
   </pc:docChgLst>
+  <pc:docChgLst>
+    <pc:chgData name="Gerth Stølting Brodal" userId="04ef4784-6591-4f86-a140-f5c3b108582a" providerId="ADAL" clId="{3182D9E5-9F75-4E9E-A6C8-86AC2F6C117C}"/>
+    <pc:docChg chg="undo custSel modSld">
+      <pc:chgData name="Gerth Stølting Brodal" userId="04ef4784-6591-4f86-a140-f5c3b108582a" providerId="ADAL" clId="{3182D9E5-9F75-4E9E-A6C8-86AC2F6C117C}" dt="2024-04-10T06:19:07.264" v="190" actId="6549"/>
+      <pc:docMkLst>
+        <pc:docMk/>
+      </pc:docMkLst>
+      <pc:sldChg chg="modSp mod">
+        <pc:chgData name="Gerth Stølting Brodal" userId="04ef4784-6591-4f86-a140-f5c3b108582a" providerId="ADAL" clId="{3182D9E5-9F75-4E9E-A6C8-86AC2F6C117C}" dt="2024-04-10T06:03:01.611" v="114" actId="1076"/>
+        <pc:sldMkLst>
+          <pc:docMk/>
+          <pc:sldMk cId="2655291698" sldId="776"/>
+        </pc:sldMkLst>
+        <pc:spChg chg="mod">
+          <ac:chgData name="Gerth Stølting Brodal" userId="04ef4784-6591-4f86-a140-f5c3b108582a" providerId="ADAL" clId="{3182D9E5-9F75-4E9E-A6C8-86AC2F6C117C}" dt="2024-04-10T06:02:57.681" v="113" actId="27636"/>
+          <ac:spMkLst>
+            <pc:docMk/>
+            <pc:sldMk cId="2655291698" sldId="776"/>
+            <ac:spMk id="8" creationId="{00000000-0000-0000-0000-000000000000}"/>
+          </ac:spMkLst>
+        </pc:spChg>
+        <pc:picChg chg="mod">
+          <ac:chgData name="Gerth Stølting Brodal" userId="04ef4784-6591-4f86-a140-f5c3b108582a" providerId="ADAL" clId="{3182D9E5-9F75-4E9E-A6C8-86AC2F6C117C}" dt="2024-04-10T06:03:01.611" v="114" actId="1076"/>
+          <ac:picMkLst>
+            <pc:docMk/>
+            <pc:sldMk cId="2655291698" sldId="776"/>
+            <ac:picMk id="6" creationId="{00000000-0000-0000-0000-000000000000}"/>
+          </ac:picMkLst>
+        </pc:picChg>
+      </pc:sldChg>
+      <pc:sldChg chg="modNotesTx">
+        <pc:chgData name="Gerth Stølting Brodal" userId="04ef4784-6591-4f86-a140-f5c3b108582a" providerId="ADAL" clId="{3182D9E5-9F75-4E9E-A6C8-86AC2F6C117C}" dt="2024-04-10T06:19:07.264" v="190" actId="6549"/>
+        <pc:sldMkLst>
+          <pc:docMk/>
+          <pc:sldMk cId="1178474818" sldId="783"/>
+        </pc:sldMkLst>
+      </pc:sldChg>
+      <pc:sldChg chg="modNotesTx">
+        <pc:chgData name="Gerth Stølting Brodal" userId="04ef4784-6591-4f86-a140-f5c3b108582a" providerId="ADAL" clId="{3182D9E5-9F75-4E9E-A6C8-86AC2F6C117C}" dt="2024-04-10T06:13:55.292" v="163" actId="20577"/>
+        <pc:sldMkLst>
+          <pc:docMk/>
+          <pc:sldMk cId="1989879142" sldId="792"/>
+        </pc:sldMkLst>
+      </pc:sldChg>
+    </pc:docChg>
+  </pc:docChgLst>
 </pc:chgInfo>
 </file>
 
@@ -843,7 +889,7 @@
           <a:p>
             <a:fld id="{FB1A172F-81D4-4DC4-9113-1DBD56EC3646}" type="datetimeFigureOut">
               <a:rPr lang="en-US" smtClean="0"/>
-              <a:t>4/16/2023</a:t>
+              <a:t>4/10/2024</a:t>
             </a:fld>
             <a:endParaRPr lang="en-US"/>
           </a:p>
@@ -1525,6 +1571,108 @@
           <a:p>
             <a:r>
               <a:rPr lang="da-DK" dirty="0"/>
+              <a:t>division = done by broadcasting</a:t>
+            </a:r>
+          </a:p>
+        </p:txBody>
+      </p:sp>
+      <p:sp>
+        <p:nvSpPr>
+          <p:cNvPr id="4" name="Slide Number Placeholder 3"/>
+          <p:cNvSpPr>
+            <a:spLocks noGrp="1"/>
+          </p:cNvSpPr>
+          <p:nvPr>
+            <p:ph type="sldNum" sz="quarter" idx="5"/>
+          </p:nvPr>
+        </p:nvSpPr>
+        <p:spPr/>
+        <p:txBody>
+          <a:bodyPr/>
+          <a:lstStyle/>
+          <a:p>
+            <a:fld id="{CD563DD8-32AB-41BE-B1C6-8EAC45222ACE}" type="slidenum">
+              <a:rPr lang="en-US" smtClean="0"/>
+              <a:t>10</a:t>
+            </a:fld>
+            <a:endParaRPr lang="en-US"/>
+          </a:p>
+        </p:txBody>
+      </p:sp>
+    </p:spTree>
+    <p:extLst>
+      <p:ext uri="{BB962C8B-B14F-4D97-AF65-F5344CB8AC3E}">
+        <p14:creationId xmlns:p14="http://schemas.microsoft.com/office/powerpoint/2010/main" val="1723953493"/>
+      </p:ext>
+    </p:extLst>
+  </p:cSld>
+  <p:clrMapOvr>
+    <a:masterClrMapping/>
+  </p:clrMapOvr>
+</p:notes>
+</file>
+
+<file path=ppt/notesSlides/notesSlide6.xml><?xml version="1.0" encoding="utf-8"?>
+<p:notes xmlns:a="http://schemas.openxmlformats.org/drawingml/2006/main" xmlns:r="http://schemas.openxmlformats.org/officeDocument/2006/relationships" xmlns:p="http://schemas.openxmlformats.org/presentationml/2006/main">
+  <p:cSld>
+    <p:spTree>
+      <p:nvGrpSpPr>
+        <p:cNvPr id="1" name=""/>
+        <p:cNvGrpSpPr/>
+        <p:nvPr/>
+      </p:nvGrpSpPr>
+      <p:grpSpPr>
+        <a:xfrm>
+          <a:off x="0" y="0"/>
+          <a:ext cx="0" cy="0"/>
+          <a:chOff x="0" y="0"/>
+          <a:chExt cx="0" cy="0"/>
+        </a:xfrm>
+      </p:grpSpPr>
+      <p:sp>
+        <p:nvSpPr>
+          <p:cNvPr id="2" name="Slide Image Placeholder 1"/>
+          <p:cNvSpPr>
+            <a:spLocks noGrp="1" noRot="1" noChangeAspect="1"/>
+          </p:cNvSpPr>
+          <p:nvPr>
+            <p:ph type="sldImg"/>
+          </p:nvPr>
+        </p:nvSpPr>
+        <p:spPr/>
+      </p:sp>
+      <p:sp>
+        <p:nvSpPr>
+          <p:cNvPr id="3" name="Notes Placeholder 2"/>
+          <p:cNvSpPr>
+            <a:spLocks noGrp="1"/>
+          </p:cNvSpPr>
+          <p:nvPr>
+            <p:ph type="body" idx="1"/>
+          </p:nvPr>
+        </p:nvSpPr>
+        <p:spPr/>
+        <p:txBody>
+          <a:bodyPr/>
+          <a:lstStyle/>
+          <a:p>
+            <a:r>
+              <a:rPr lang="da-DK"/>
+              <a:t>p </a:t>
+            </a:r>
+            <a:r>
+              <a:rPr lang="da-DK" dirty="0"/>
+              <a:t>= column </a:t>
+            </a:r>
+            <a:r>
+              <a:rPr lang="da-DK" dirty="0" err="1"/>
+              <a:t>vector</a:t>
+            </a:r>
+            <a:endParaRPr lang="da-DK" dirty="0"/>
+          </a:p>
+          <a:p>
+            <a:r>
+              <a:rPr lang="da-DK" dirty="0"/>
               <a:t>A = </a:t>
             </a:r>
             <a:r>
@@ -1555,7 +1703,15 @@
             </a:r>
             <a:r>
               <a:rPr lang="da-DK" dirty="0"/>
-              <a:t>(A, A)</a:t>
+              <a:t>(A, A)  # </a:t>
+            </a:r>
+            <a:r>
+              <a:rPr lang="da-DK" dirty="0" err="1"/>
+              <a:t>result</a:t>
+            </a:r>
+            <a:r>
+              <a:rPr lang="da-DK" dirty="0"/>
+              <a:t> is 1-vector</a:t>
             </a:r>
           </a:p>
           <a:p>
@@ -1569,8 +1725,21 @@
             </a:r>
             <a:r>
               <a:rPr lang="da-DK" dirty="0"/>
-              <a:t>(A, A, axis=0)</a:t>
-            </a:r>
+              <a:t>(A, A, axis=0)  # </a:t>
+            </a:r>
+            <a:r>
+              <a:rPr lang="da-DK" dirty="0" err="1"/>
+              <a:t>added</a:t>
+            </a:r>
+            <a:r>
+              <a:rPr lang="da-DK" dirty="0"/>
+              <a:t> as </a:t>
+            </a:r>
+            <a:r>
+              <a:rPr lang="da-DK" dirty="0" err="1"/>
+              <a:t>roows</a:t>
+            </a:r>
+            <a:endParaRPr lang="da-DK" dirty="0"/>
           </a:p>
           <a:p>
             <a:r>
@@ -1583,7 +1752,15 @@
             </a:r>
             <a:r>
               <a:rPr lang="da-DK" dirty="0"/>
-              <a:t>(A, A, axis=1)</a:t>
+              <a:t>(A, A, axis=1)  # </a:t>
+            </a:r>
+            <a:r>
+              <a:rPr lang="da-DK" dirty="0" err="1"/>
+              <a:t>added</a:t>
+            </a:r>
+            <a:r>
+              <a:rPr lang="da-DK" dirty="0"/>
+              <a:t> as columns</a:t>
             </a:r>
           </a:p>
           <a:p>
@@ -1627,7 +1804,7 @@
 </p:notes>
 </file>
 
-<file path=ppt/notesSlides/notesSlide6.xml><?xml version="1.0" encoding="utf-8"?>
+<file path=ppt/notesSlides/notesSlide7.xml><?xml version="1.0" encoding="utf-8"?>
 <p:notes xmlns:a="http://schemas.openxmlformats.org/drawingml/2006/main" xmlns:r="http://schemas.openxmlformats.org/officeDocument/2006/relationships" xmlns:p="http://schemas.openxmlformats.org/presentationml/2006/main">
   <p:cSld>
     <p:spTree>
@@ -1864,7 +2041,7 @@
           <a:p>
             <a:fld id="{0560A9CD-0304-4E0B-9E82-E7E0115DE05B}" type="datetimeFigureOut">
               <a:rPr lang="en-US" smtClean="0"/>
-              <a:t>4/16/2023</a:t>
+              <a:t>4/10/2024</a:t>
             </a:fld>
             <a:endParaRPr lang="en-US"/>
           </a:p>
@@ -2032,7 +2209,7 @@
           <a:p>
             <a:fld id="{0560A9CD-0304-4E0B-9E82-E7E0115DE05B}" type="datetimeFigureOut">
               <a:rPr lang="en-US" smtClean="0"/>
-              <a:t>4/16/2023</a:t>
+              <a:t>4/10/2024</a:t>
             </a:fld>
             <a:endParaRPr lang="en-US"/>
           </a:p>
@@ -2210,7 +2387,7 @@
           <a:p>
             <a:fld id="{0560A9CD-0304-4E0B-9E82-E7E0115DE05B}" type="datetimeFigureOut">
               <a:rPr lang="en-US" smtClean="0"/>
-              <a:t>4/16/2023</a:t>
+              <a:t>4/10/2024</a:t>
             </a:fld>
             <a:endParaRPr lang="en-US"/>
           </a:p>
@@ -2393,7 +2570,7 @@
           <a:p>
             <a:fld id="{0560A9CD-0304-4E0B-9E82-E7E0115DE05B}" type="datetimeFigureOut">
               <a:rPr lang="en-US" smtClean="0"/>
-              <a:t>4/16/2023</a:t>
+              <a:t>4/10/2024</a:t>
             </a:fld>
             <a:endParaRPr lang="en-US"/>
           </a:p>
@@ -2638,7 +2815,7 @@
           <a:p>
             <a:fld id="{0560A9CD-0304-4E0B-9E82-E7E0115DE05B}" type="datetimeFigureOut">
               <a:rPr lang="en-US" smtClean="0"/>
-              <a:t>4/16/2023</a:t>
+              <a:t>4/10/2024</a:t>
             </a:fld>
             <a:endParaRPr lang="en-US"/>
           </a:p>
@@ -2867,7 +3044,7 @@
           <a:p>
             <a:fld id="{0560A9CD-0304-4E0B-9E82-E7E0115DE05B}" type="datetimeFigureOut">
               <a:rPr lang="en-US" smtClean="0"/>
-              <a:t>4/16/2023</a:t>
+              <a:t>4/10/2024</a:t>
             </a:fld>
             <a:endParaRPr lang="en-US"/>
           </a:p>
@@ -3231,7 +3408,7 @@
           <a:p>
             <a:fld id="{0560A9CD-0304-4E0B-9E82-E7E0115DE05B}" type="datetimeFigureOut">
               <a:rPr lang="en-US" smtClean="0"/>
-              <a:t>4/16/2023</a:t>
+              <a:t>4/10/2024</a:t>
             </a:fld>
             <a:endParaRPr lang="en-US"/>
           </a:p>
@@ -3348,7 +3525,7 @@
           <a:p>
             <a:fld id="{0560A9CD-0304-4E0B-9E82-E7E0115DE05B}" type="datetimeFigureOut">
               <a:rPr lang="en-US" smtClean="0"/>
-              <a:t>4/16/2023</a:t>
+              <a:t>4/10/2024</a:t>
             </a:fld>
             <a:endParaRPr lang="en-US"/>
           </a:p>
@@ -3443,7 +3620,7 @@
           <a:p>
             <a:fld id="{0560A9CD-0304-4E0B-9E82-E7E0115DE05B}" type="datetimeFigureOut">
               <a:rPr lang="en-US" smtClean="0"/>
-              <a:t>4/16/2023</a:t>
+              <a:t>4/10/2024</a:t>
             </a:fld>
             <a:endParaRPr lang="en-US"/>
           </a:p>
@@ -3718,7 +3895,7 @@
           <a:p>
             <a:fld id="{0560A9CD-0304-4E0B-9E82-E7E0115DE05B}" type="datetimeFigureOut">
               <a:rPr lang="en-US" smtClean="0"/>
-              <a:t>4/16/2023</a:t>
+              <a:t>4/10/2024</a:t>
             </a:fld>
             <a:endParaRPr lang="en-US"/>
           </a:p>
@@ -3970,7 +4147,7 @@
           <a:p>
             <a:fld id="{0560A9CD-0304-4E0B-9E82-E7E0115DE05B}" type="datetimeFigureOut">
               <a:rPr lang="en-US" smtClean="0"/>
-              <a:t>4/16/2023</a:t>
+              <a:t>4/10/2024</a:t>
             </a:fld>
             <a:endParaRPr lang="en-US"/>
           </a:p>
@@ -4181,7 +4358,7 @@
           <a:p>
             <a:fld id="{0560A9CD-0304-4E0B-9E82-E7E0115DE05B}" type="datetimeFigureOut">
               <a:rPr lang="en-US" smtClean="0"/>
-              <a:t>4/16/2023</a:t>
+              <a:t>4/10/2024</a:t>
             </a:fld>
             <a:endParaRPr lang="en-US"/>
           </a:p>
@@ -5403,7 +5580,7 @@
             <p:nvPr/>
           </p:nvPicPr>
           <p:blipFill>
-            <a:blip r:embed="rId2" cstate="print">
+            <a:blip r:embed="rId3" cstate="print">
               <a:extLst>
                 <a:ext uri="{28A0092B-C50C-407E-A947-70E740481C1C}">
                   <a14:useLocalDpi xmlns:a14="http://schemas.microsoft.com/office/drawing/2010/main" val="0"/>
@@ -21549,7 +21726,7 @@
         </p:blipFill>
         <p:spPr>
           <a:xfrm>
-            <a:off x="1050900" y="4747765"/>
+            <a:off x="1660500" y="5001428"/>
             <a:ext cx="5857461" cy="1676400"/>
           </a:xfrm>
           <a:prstGeom prst="rect">
@@ -21572,8 +21749,8 @@
         </p:nvSpPr>
         <p:spPr>
           <a:xfrm>
-            <a:off x="430696" y="1649897"/>
-            <a:ext cx="11025810" cy="2908852"/>
+            <a:off x="430696" y="1649896"/>
+            <a:ext cx="11025810" cy="3265003"/>
           </a:xfrm>
         </p:spPr>
         <p:txBody>
@@ -21643,24 +21820,24 @@
           <a:p>
             <a:r>
               <a:rPr lang="en-US" dirty="0"/>
-              <a:t>Google’s PageRank algorithm was described</a:t>
+              <a:t>Google’s PageRank algorithm was described in (</a:t>
+            </a:r>
+            <a:r>
+              <a:rPr lang="en-US" dirty="0">
+                <a:hlinkClick r:id="rId4"/>
+              </a:rPr>
+              <a:t>infolab.stanford.edu/pub/papers/google.pdf</a:t>
+            </a:r>
+            <a:r>
+              <a:rPr lang="en-US" dirty="0"/>
+              <a:t>, </a:t>
             </a:r>
             <a:br>
               <a:rPr lang="en-US" dirty="0"/>
             </a:br>
             <a:r>
               <a:rPr lang="en-US" dirty="0"/>
-              <a:t>in (</a:t>
-            </a:r>
-            <a:r>
-              <a:rPr lang="en-US" dirty="0">
-                <a:hlinkClick r:id="rId4"/>
-              </a:rPr>
-              <a:t>ilpubs.stanford.edu:8090/361/</a:t>
-            </a:r>
-            <a:r>
-              <a:rPr lang="en-US" dirty="0"/>
-              <a:t>, 1998)</a:t>
+              <a:t>1998)</a:t>
             </a:r>
           </a:p>
         </p:txBody>

</xml_diff>

<commit_message>
ipsa21r-answers.zip ipsa21r.zip project-front-page.aux project-front-page.docx project-front-page.pdf project-front-page.tex project-intro.md all-slides.pdf introduction.pdf introduction.pptx linear_programming.pdf linear_programming.pptx
</commit_message>
<xml_diff>
--- a/ipsa/slides/linear_programming.pptx
+++ b/ipsa/slides/linear_programming.pptx
@@ -139,7 +139,7 @@
 <file path=ppt/revisionInfo.xml><?xml version="1.0" encoding="utf-8"?>
 <p1510:revInfo xmlns:a="http://schemas.openxmlformats.org/drawingml/2006/main" xmlns:r="http://schemas.openxmlformats.org/officeDocument/2006/relationships" xmlns:p1510="http://schemas.microsoft.com/office/powerpoint/2015/10/main">
   <p1510:revLst>
-    <p1510:client id="{3182D9E5-9F75-4E9E-A6C8-86AC2F6C117C}" v="1" dt="2024-04-10T06:02:25.339"/>
+    <p1510:client id="{81AC35D5-6BEF-4A15-80CA-88A8229CCE5F}" v="16" dt="2025-06-03T16:02:43.885"/>
   </p1510:revLst>
 </p1510:revInfo>
 </file>
@@ -159,14 +159,6 @@
           <pc:docMk/>
           <pc:sldMk cId="84816449" sldId="788"/>
         </pc:sldMkLst>
-        <pc:graphicFrameChg chg="modGraphic">
-          <ac:chgData name="Gerth Stølting Brodal" userId="04ef4784-6591-4f86-a140-f5c3b108582a" providerId="ADAL" clId="{C39A38A5-3370-482A-A0A5-CF635498757E}" dt="2023-03-11T00:05:36.236" v="47" actId="313"/>
-          <ac:graphicFrameMkLst>
-            <pc:docMk/>
-            <pc:sldMk cId="84816449" sldId="788"/>
-            <ac:graphicFrameMk id="14" creationId="{00000000-0000-0000-0000-000000000000}"/>
-          </ac:graphicFrameMkLst>
-        </pc:graphicFrameChg>
       </pc:sldChg>
       <pc:sldChg chg="modSp mod">
         <pc:chgData name="Gerth Stølting Brodal" userId="04ef4784-6591-4f86-a140-f5c3b108582a" providerId="ADAL" clId="{C39A38A5-3370-482A-A0A5-CF635498757E}" dt="2023-03-11T00:02:19.494" v="41" actId="313"/>
@@ -174,14 +166,6 @@
           <pc:docMk/>
           <pc:sldMk cId="2230500912" sldId="790"/>
         </pc:sldMkLst>
-        <pc:graphicFrameChg chg="modGraphic">
-          <ac:chgData name="Gerth Stølting Brodal" userId="04ef4784-6591-4f86-a140-f5c3b108582a" providerId="ADAL" clId="{C39A38A5-3370-482A-A0A5-CF635498757E}" dt="2023-03-11T00:02:19.494" v="41" actId="313"/>
-          <ac:graphicFrameMkLst>
-            <pc:docMk/>
-            <pc:sldMk cId="2230500912" sldId="790"/>
-            <ac:graphicFrameMk id="14" creationId="{00000000-0000-0000-0000-000000000000}"/>
-          </ac:graphicFrameMkLst>
-        </pc:graphicFrameChg>
       </pc:sldChg>
     </pc:docChg>
   </pc:docChgLst>
@@ -198,14 +182,6 @@
           <pc:docMk/>
           <pc:sldMk cId="3278452034" sldId="772"/>
         </pc:sldMkLst>
-        <pc:spChg chg="mod">
-          <ac:chgData name="Gerth Stølting Brodal" userId="04ef4784-6591-4f86-a140-f5c3b108582a" providerId="ADAL" clId="{0DB94234-3218-4FCB-8C1F-DFC91B9BC4D4}" dt="2022-04-07T16:55:43.365" v="238" actId="6549"/>
-          <ac:spMkLst>
-            <pc:docMk/>
-            <pc:sldMk cId="3278452034" sldId="772"/>
-            <ac:spMk id="4" creationId="{00000000-0000-0000-0000-000000000000}"/>
-          </ac:spMkLst>
-        </pc:spChg>
       </pc:sldChg>
       <pc:sldChg chg="modSp mod">
         <pc:chgData name="Gerth Stølting Brodal" userId="04ef4784-6591-4f86-a140-f5c3b108582a" providerId="ADAL" clId="{0DB94234-3218-4FCB-8C1F-DFC91B9BC4D4}" dt="2022-04-03T07:00:03.691" v="42" actId="20577"/>
@@ -213,30 +189,6 @@
           <pc:docMk/>
           <pc:sldMk cId="1272159487" sldId="774"/>
         </pc:sldMkLst>
-        <pc:spChg chg="mod">
-          <ac:chgData name="Gerth Stølting Brodal" userId="04ef4784-6591-4f86-a140-f5c3b108582a" providerId="ADAL" clId="{0DB94234-3218-4FCB-8C1F-DFC91B9BC4D4}" dt="2022-04-03T06:59:40.012" v="13" actId="20577"/>
-          <ac:spMkLst>
-            <pc:docMk/>
-            <pc:sldMk cId="1272159487" sldId="774"/>
-            <ac:spMk id="13" creationId="{00000000-0000-0000-0000-000000000000}"/>
-          </ac:spMkLst>
-        </pc:spChg>
-        <pc:spChg chg="mod">
-          <ac:chgData name="Gerth Stølting Brodal" userId="04ef4784-6591-4f86-a140-f5c3b108582a" providerId="ADAL" clId="{0DB94234-3218-4FCB-8C1F-DFC91B9BC4D4}" dt="2022-04-03T06:59:57.282" v="14" actId="14100"/>
-          <ac:spMkLst>
-            <pc:docMk/>
-            <pc:sldMk cId="1272159487" sldId="774"/>
-            <ac:spMk id="21" creationId="{00000000-0000-0000-0000-000000000000}"/>
-          </ac:spMkLst>
-        </pc:spChg>
-        <pc:spChg chg="mod">
-          <ac:chgData name="Gerth Stølting Brodal" userId="04ef4784-6591-4f86-a140-f5c3b108582a" providerId="ADAL" clId="{0DB94234-3218-4FCB-8C1F-DFC91B9BC4D4}" dt="2022-04-03T07:00:03.691" v="42" actId="20577"/>
-          <ac:spMkLst>
-            <pc:docMk/>
-            <pc:sldMk cId="1272159487" sldId="774"/>
-            <ac:spMk id="23" creationId="{00000000-0000-0000-0000-000000000000}"/>
-          </ac:spMkLst>
-        </pc:spChg>
       </pc:sldChg>
     </pc:docChg>
   </pc:docChgLst>
@@ -253,14 +205,6 @@
           <pc:docMk/>
           <pc:sldMk cId="1272159487" sldId="774"/>
         </pc:sldMkLst>
-        <pc:spChg chg="mod">
-          <ac:chgData name="Gerth Stølting Brodal" userId="04ef4784-6591-4f86-a140-f5c3b108582a" providerId="ADAL" clId="{FCA54829-69E0-4900-9165-83DAEE965D83}" dt="2023-04-16T11:46:18.083" v="199" actId="20577"/>
-          <ac:spMkLst>
-            <pc:docMk/>
-            <pc:sldMk cId="1272159487" sldId="774"/>
-            <ac:spMk id="3" creationId="{00000000-0000-0000-0000-000000000000}"/>
-          </ac:spMkLst>
-        </pc:spChg>
       </pc:sldChg>
       <pc:sldChg chg="addSp modSp mod">
         <pc:chgData name="Gerth Stølting Brodal" userId="04ef4784-6591-4f86-a140-f5c3b108582a" providerId="ADAL" clId="{FCA54829-69E0-4900-9165-83DAEE965D83}" dt="2023-04-16T11:48:39.280" v="201" actId="1076"/>
@@ -268,14 +212,6 @@
           <pc:docMk/>
           <pc:sldMk cId="4011126068" sldId="775"/>
         </pc:sldMkLst>
-        <pc:picChg chg="add mod">
-          <ac:chgData name="Gerth Stølting Brodal" userId="04ef4784-6591-4f86-a140-f5c3b108582a" providerId="ADAL" clId="{FCA54829-69E0-4900-9165-83DAEE965D83}" dt="2023-04-16T11:48:39.280" v="201" actId="1076"/>
-          <ac:picMkLst>
-            <pc:docMk/>
-            <pc:sldMk cId="4011126068" sldId="775"/>
-            <ac:picMk id="3" creationId="{05D769A4-3D29-D5AA-40CD-D03ADD3B32E4}"/>
-          </ac:picMkLst>
-        </pc:picChg>
       </pc:sldChg>
       <pc:sldChg chg="mod modShow">
         <pc:chgData name="Gerth Stølting Brodal" userId="04ef4784-6591-4f86-a140-f5c3b108582a" providerId="ADAL" clId="{FCA54829-69E0-4900-9165-83DAEE965D83}" dt="2023-04-16T10:43:43.951" v="4" actId="729"/>
@@ -290,70 +226,6 @@
           <pc:docMk/>
           <pc:sldMk cId="4134781063" sldId="780"/>
         </pc:sldMkLst>
-        <pc:spChg chg="mod">
-          <ac:chgData name="Gerth Stølting Brodal" userId="04ef4784-6591-4f86-a140-f5c3b108582a" providerId="ADAL" clId="{FCA54829-69E0-4900-9165-83DAEE965D83}" dt="2023-04-16T11:24:39.591" v="115" actId="1035"/>
-          <ac:spMkLst>
-            <pc:docMk/>
-            <pc:sldMk cId="4134781063" sldId="780"/>
-            <ac:spMk id="8" creationId="{00000000-0000-0000-0000-000000000000}"/>
-          </ac:spMkLst>
-        </pc:spChg>
-        <pc:spChg chg="mod">
-          <ac:chgData name="Gerth Stølting Brodal" userId="04ef4784-6591-4f86-a140-f5c3b108582a" providerId="ADAL" clId="{FCA54829-69E0-4900-9165-83DAEE965D83}" dt="2023-04-16T11:21:35.141" v="85" actId="208"/>
-          <ac:spMkLst>
-            <pc:docMk/>
-            <pc:sldMk cId="4134781063" sldId="780"/>
-            <ac:spMk id="9" creationId="{00000000-0000-0000-0000-000000000000}"/>
-          </ac:spMkLst>
-        </pc:spChg>
-        <pc:spChg chg="mod">
-          <ac:chgData name="Gerth Stølting Brodal" userId="04ef4784-6591-4f86-a140-f5c3b108582a" providerId="ADAL" clId="{FCA54829-69E0-4900-9165-83DAEE965D83}" dt="2023-04-16T11:24:44.093" v="118" actId="1035"/>
-          <ac:spMkLst>
-            <pc:docMk/>
-            <pc:sldMk cId="4134781063" sldId="780"/>
-            <ac:spMk id="10" creationId="{00000000-0000-0000-0000-000000000000}"/>
-          </ac:spMkLst>
-        </pc:spChg>
-        <pc:spChg chg="mod">
-          <ac:chgData name="Gerth Stølting Brodal" userId="04ef4784-6591-4f86-a140-f5c3b108582a" providerId="ADAL" clId="{FCA54829-69E0-4900-9165-83DAEE965D83}" dt="2023-04-16T11:21:35.141" v="85" actId="208"/>
-          <ac:spMkLst>
-            <pc:docMk/>
-            <pc:sldMk cId="4134781063" sldId="780"/>
-            <ac:spMk id="11" creationId="{00000000-0000-0000-0000-000000000000}"/>
-          </ac:spMkLst>
-        </pc:spChg>
-        <pc:spChg chg="mod">
-          <ac:chgData name="Gerth Stølting Brodal" userId="04ef4784-6591-4f86-a140-f5c3b108582a" providerId="ADAL" clId="{FCA54829-69E0-4900-9165-83DAEE965D83}" dt="2023-04-16T11:21:35.141" v="85" actId="208"/>
-          <ac:spMkLst>
-            <pc:docMk/>
-            <pc:sldMk cId="4134781063" sldId="780"/>
-            <ac:spMk id="12" creationId="{00000000-0000-0000-0000-000000000000}"/>
-          </ac:spMkLst>
-        </pc:spChg>
-        <pc:spChg chg="mod">
-          <ac:chgData name="Gerth Stølting Brodal" userId="04ef4784-6591-4f86-a140-f5c3b108582a" providerId="ADAL" clId="{FCA54829-69E0-4900-9165-83DAEE965D83}" dt="2023-04-16T11:21:35.141" v="85" actId="208"/>
-          <ac:spMkLst>
-            <pc:docMk/>
-            <pc:sldMk cId="4134781063" sldId="780"/>
-            <ac:spMk id="13" creationId="{00000000-0000-0000-0000-000000000000}"/>
-          </ac:spMkLst>
-        </pc:spChg>
-        <pc:graphicFrameChg chg="mod">
-          <ac:chgData name="Gerth Stølting Brodal" userId="04ef4784-6591-4f86-a140-f5c3b108582a" providerId="ADAL" clId="{FCA54829-69E0-4900-9165-83DAEE965D83}" dt="2023-04-16T10:48:04.825" v="7"/>
-          <ac:graphicFrameMkLst>
-            <pc:docMk/>
-            <pc:sldMk cId="4134781063" sldId="780"/>
-            <ac:graphicFrameMk id="6" creationId="{00000000-0000-0000-0000-000000000000}"/>
-          </ac:graphicFrameMkLst>
-        </pc:graphicFrameChg>
-        <pc:picChg chg="mod">
-          <ac:chgData name="Gerth Stølting Brodal" userId="04ef4784-6591-4f86-a140-f5c3b108582a" providerId="ADAL" clId="{FCA54829-69E0-4900-9165-83DAEE965D83}" dt="2023-04-16T11:21:44.249" v="87" actId="1582"/>
-          <ac:picMkLst>
-            <pc:docMk/>
-            <pc:sldMk cId="4134781063" sldId="780"/>
-            <ac:picMk id="7" creationId="{00000000-0000-0000-0000-000000000000}"/>
-          </ac:picMkLst>
-        </pc:picChg>
       </pc:sldChg>
       <pc:sldChg chg="modSp mod">
         <pc:chgData name="Gerth Stølting Brodal" userId="04ef4784-6591-4f86-a140-f5c3b108582a" providerId="ADAL" clId="{FCA54829-69E0-4900-9165-83DAEE965D83}" dt="2023-04-16T11:34:14.568" v="197" actId="20577"/>
@@ -361,30 +233,6 @@
           <pc:docMk/>
           <pc:sldMk cId="3629567511" sldId="782"/>
         </pc:sldMkLst>
-        <pc:spChg chg="mod">
-          <ac:chgData name="Gerth Stølting Brodal" userId="04ef4784-6591-4f86-a140-f5c3b108582a" providerId="ADAL" clId="{FCA54829-69E0-4900-9165-83DAEE965D83}" dt="2023-04-16T11:33:51.079" v="196" actId="20577"/>
-          <ac:spMkLst>
-            <pc:docMk/>
-            <pc:sldMk cId="3629567511" sldId="782"/>
-            <ac:spMk id="3" creationId="{00000000-0000-0000-0000-000000000000}"/>
-          </ac:spMkLst>
-        </pc:spChg>
-        <pc:spChg chg="mod">
-          <ac:chgData name="Gerth Stølting Brodal" userId="04ef4784-6591-4f86-a140-f5c3b108582a" providerId="ADAL" clId="{FCA54829-69E0-4900-9165-83DAEE965D83}" dt="2023-04-16T11:32:57.532" v="188" actId="58"/>
-          <ac:spMkLst>
-            <pc:docMk/>
-            <pc:sldMk cId="3629567511" sldId="782"/>
-            <ac:spMk id="7" creationId="{00000000-0000-0000-0000-000000000000}"/>
-          </ac:spMkLst>
-        </pc:spChg>
-        <pc:graphicFrameChg chg="modGraphic">
-          <ac:chgData name="Gerth Stølting Brodal" userId="04ef4784-6591-4f86-a140-f5c3b108582a" providerId="ADAL" clId="{FCA54829-69E0-4900-9165-83DAEE965D83}" dt="2023-04-16T11:34:14.568" v="197" actId="20577"/>
-          <ac:graphicFrameMkLst>
-            <pc:docMk/>
-            <pc:sldMk cId="3629567511" sldId="782"/>
-            <ac:graphicFrameMk id="4" creationId="{00000000-0000-0000-0000-000000000000}"/>
-          </ac:graphicFrameMkLst>
-        </pc:graphicFrameChg>
       </pc:sldChg>
       <pc:sldChg chg="addSp delSp modSp mod modNotesTx">
         <pc:chgData name="Gerth Stølting Brodal" userId="04ef4784-6591-4f86-a140-f5c3b108582a" providerId="ADAL" clId="{FCA54829-69E0-4900-9165-83DAEE965D83}" dt="2023-04-16T11:26:57.468" v="178" actId="1035"/>
@@ -392,78 +240,6 @@
           <pc:docMk/>
           <pc:sldMk cId="1178474818" sldId="783"/>
         </pc:sldMkLst>
-        <pc:spChg chg="mod">
-          <ac:chgData name="Gerth Stølting Brodal" userId="04ef4784-6591-4f86-a140-f5c3b108582a" providerId="ADAL" clId="{FCA54829-69E0-4900-9165-83DAEE965D83}" dt="2023-04-16T11:26:52.287" v="172" actId="1035"/>
-          <ac:spMkLst>
-            <pc:docMk/>
-            <pc:sldMk cId="1178474818" sldId="783"/>
-            <ac:spMk id="16" creationId="{5EAAFEFF-4F9C-88B0-B055-B4D7B34F1E5A}"/>
-          </ac:spMkLst>
-        </pc:spChg>
-        <pc:spChg chg="mod">
-          <ac:chgData name="Gerth Stølting Brodal" userId="04ef4784-6591-4f86-a140-f5c3b108582a" providerId="ADAL" clId="{FCA54829-69E0-4900-9165-83DAEE965D83}" dt="2023-04-16T11:22:30.122" v="94"/>
-          <ac:spMkLst>
-            <pc:docMk/>
-            <pc:sldMk cId="1178474818" sldId="783"/>
-            <ac:spMk id="17" creationId="{426709AE-5ED2-0F69-1028-E4616FA26765}"/>
-          </ac:spMkLst>
-        </pc:spChg>
-        <pc:spChg chg="mod">
-          <ac:chgData name="Gerth Stølting Brodal" userId="04ef4784-6591-4f86-a140-f5c3b108582a" providerId="ADAL" clId="{FCA54829-69E0-4900-9165-83DAEE965D83}" dt="2023-04-16T11:26:57.468" v="178" actId="1035"/>
-          <ac:spMkLst>
-            <pc:docMk/>
-            <pc:sldMk cId="1178474818" sldId="783"/>
-            <ac:spMk id="18" creationId="{C3F1AA50-6A08-B972-8579-5487D87AF4B6}"/>
-          </ac:spMkLst>
-        </pc:spChg>
-        <pc:spChg chg="mod">
-          <ac:chgData name="Gerth Stølting Brodal" userId="04ef4784-6591-4f86-a140-f5c3b108582a" providerId="ADAL" clId="{FCA54829-69E0-4900-9165-83DAEE965D83}" dt="2023-04-16T11:22:30.122" v="94"/>
-          <ac:spMkLst>
-            <pc:docMk/>
-            <pc:sldMk cId="1178474818" sldId="783"/>
-            <ac:spMk id="19" creationId="{1291DC0C-E042-C215-1832-AFE4ABB68CC4}"/>
-          </ac:spMkLst>
-        </pc:spChg>
-        <pc:spChg chg="mod">
-          <ac:chgData name="Gerth Stølting Brodal" userId="04ef4784-6591-4f86-a140-f5c3b108582a" providerId="ADAL" clId="{FCA54829-69E0-4900-9165-83DAEE965D83}" dt="2023-04-16T11:22:30.122" v="94"/>
-          <ac:spMkLst>
-            <pc:docMk/>
-            <pc:sldMk cId="1178474818" sldId="783"/>
-            <ac:spMk id="20" creationId="{2AF0E2DB-445C-7E2E-24B8-EAC65B724984}"/>
-          </ac:spMkLst>
-        </pc:spChg>
-        <pc:spChg chg="mod">
-          <ac:chgData name="Gerth Stølting Brodal" userId="04ef4784-6591-4f86-a140-f5c3b108582a" providerId="ADAL" clId="{FCA54829-69E0-4900-9165-83DAEE965D83}" dt="2023-04-16T11:22:30.122" v="94"/>
-          <ac:spMkLst>
-            <pc:docMk/>
-            <pc:sldMk cId="1178474818" sldId="783"/>
-            <ac:spMk id="21" creationId="{240303BC-7F27-7652-9D83-2D97F6103B92}"/>
-          </ac:spMkLst>
-        </pc:spChg>
-        <pc:grpChg chg="del mod">
-          <ac:chgData name="Gerth Stølting Brodal" userId="04ef4784-6591-4f86-a140-f5c3b108582a" providerId="ADAL" clId="{FCA54829-69E0-4900-9165-83DAEE965D83}" dt="2023-04-16T11:22:32.704" v="95" actId="478"/>
-          <ac:grpSpMkLst>
-            <pc:docMk/>
-            <pc:sldMk cId="1178474818" sldId="783"/>
-            <ac:grpSpMk id="5" creationId="{00000000-0000-0000-0000-000000000000}"/>
-          </ac:grpSpMkLst>
-        </pc:grpChg>
-        <pc:grpChg chg="add mod">
-          <ac:chgData name="Gerth Stølting Brodal" userId="04ef4784-6591-4f86-a140-f5c3b108582a" providerId="ADAL" clId="{FCA54829-69E0-4900-9165-83DAEE965D83}" dt="2023-04-16T11:22:36.757" v="96" actId="1076"/>
-          <ac:grpSpMkLst>
-            <pc:docMk/>
-            <pc:sldMk cId="1178474818" sldId="783"/>
-            <ac:grpSpMk id="14" creationId="{87D42C42-9F41-E26E-C95C-C487D1D37C70}"/>
-          </ac:grpSpMkLst>
-        </pc:grpChg>
-        <pc:picChg chg="mod">
-          <ac:chgData name="Gerth Stølting Brodal" userId="04ef4784-6591-4f86-a140-f5c3b108582a" providerId="ADAL" clId="{FCA54829-69E0-4900-9165-83DAEE965D83}" dt="2023-04-16T11:22:30.122" v="94"/>
-          <ac:picMkLst>
-            <pc:docMk/>
-            <pc:sldMk cId="1178474818" sldId="783"/>
-            <ac:picMk id="15" creationId="{0727C293-C901-E52A-9A47-2FAE4C75F4EE}"/>
-          </ac:picMkLst>
-        </pc:picChg>
       </pc:sldChg>
       <pc:sldChg chg="modSp mod">
         <pc:chgData name="Gerth Stølting Brodal" userId="04ef4784-6591-4f86-a140-f5c3b108582a" providerId="ADAL" clId="{FCA54829-69E0-4900-9165-83DAEE965D83}" dt="2023-04-16T11:25:37.414" v="144" actId="1035"/>
@@ -471,70 +247,6 @@
           <pc:docMk/>
           <pc:sldMk cId="3711897289" sldId="787"/>
         </pc:sldMkLst>
-        <pc:spChg chg="mod">
-          <ac:chgData name="Gerth Stølting Brodal" userId="04ef4784-6591-4f86-a140-f5c3b108582a" providerId="ADAL" clId="{FCA54829-69E0-4900-9165-83DAEE965D83}" dt="2023-04-16T11:25:37.414" v="144" actId="1035"/>
-          <ac:spMkLst>
-            <pc:docMk/>
-            <pc:sldMk cId="3711897289" sldId="787"/>
-            <ac:spMk id="8" creationId="{00000000-0000-0000-0000-000000000000}"/>
-          </ac:spMkLst>
-        </pc:spChg>
-        <pc:spChg chg="mod">
-          <ac:chgData name="Gerth Stølting Brodal" userId="04ef4784-6591-4f86-a140-f5c3b108582a" providerId="ADAL" clId="{FCA54829-69E0-4900-9165-83DAEE965D83}" dt="2023-04-16T11:21:20.814" v="79" actId="208"/>
-          <ac:spMkLst>
-            <pc:docMk/>
-            <pc:sldMk cId="3711897289" sldId="787"/>
-            <ac:spMk id="9" creationId="{00000000-0000-0000-0000-000000000000}"/>
-          </ac:spMkLst>
-        </pc:spChg>
-        <pc:spChg chg="mod">
-          <ac:chgData name="Gerth Stølting Brodal" userId="04ef4784-6591-4f86-a140-f5c3b108582a" providerId="ADAL" clId="{FCA54829-69E0-4900-9165-83DAEE965D83}" dt="2023-04-16T11:23:52.503" v="111" actId="1035"/>
-          <ac:spMkLst>
-            <pc:docMk/>
-            <pc:sldMk cId="3711897289" sldId="787"/>
-            <ac:spMk id="10" creationId="{00000000-0000-0000-0000-000000000000}"/>
-          </ac:spMkLst>
-        </pc:spChg>
-        <pc:spChg chg="mod">
-          <ac:chgData name="Gerth Stølting Brodal" userId="04ef4784-6591-4f86-a140-f5c3b108582a" providerId="ADAL" clId="{FCA54829-69E0-4900-9165-83DAEE965D83}" dt="2023-04-16T11:24:09.662" v="112" actId="1035"/>
-          <ac:spMkLst>
-            <pc:docMk/>
-            <pc:sldMk cId="3711897289" sldId="787"/>
-            <ac:spMk id="11" creationId="{00000000-0000-0000-0000-000000000000}"/>
-          </ac:spMkLst>
-        </pc:spChg>
-        <pc:spChg chg="mod">
-          <ac:chgData name="Gerth Stølting Brodal" userId="04ef4784-6591-4f86-a140-f5c3b108582a" providerId="ADAL" clId="{FCA54829-69E0-4900-9165-83DAEE965D83}" dt="2023-04-16T11:21:20.814" v="79" actId="208"/>
-          <ac:spMkLst>
-            <pc:docMk/>
-            <pc:sldMk cId="3711897289" sldId="787"/>
-            <ac:spMk id="12" creationId="{00000000-0000-0000-0000-000000000000}"/>
-          </ac:spMkLst>
-        </pc:spChg>
-        <pc:spChg chg="mod">
-          <ac:chgData name="Gerth Stølting Brodal" userId="04ef4784-6591-4f86-a140-f5c3b108582a" providerId="ADAL" clId="{FCA54829-69E0-4900-9165-83DAEE965D83}" dt="2023-04-16T11:21:20.814" v="79" actId="208"/>
-          <ac:spMkLst>
-            <pc:docMk/>
-            <pc:sldMk cId="3711897289" sldId="787"/>
-            <ac:spMk id="13" creationId="{00000000-0000-0000-0000-000000000000}"/>
-          </ac:spMkLst>
-        </pc:spChg>
-        <pc:graphicFrameChg chg="modGraphic">
-          <ac:chgData name="Gerth Stølting Brodal" userId="04ef4784-6591-4f86-a140-f5c3b108582a" providerId="ADAL" clId="{FCA54829-69E0-4900-9165-83DAEE965D83}" dt="2023-04-16T10:53:07.995" v="54" actId="6549"/>
-          <ac:graphicFrameMkLst>
-            <pc:docMk/>
-            <pc:sldMk cId="3711897289" sldId="787"/>
-            <ac:graphicFrameMk id="14" creationId="{00000000-0000-0000-0000-000000000000}"/>
-          </ac:graphicFrameMkLst>
-        </pc:graphicFrameChg>
-        <pc:picChg chg="mod">
-          <ac:chgData name="Gerth Stølting Brodal" userId="04ef4784-6591-4f86-a140-f5c3b108582a" providerId="ADAL" clId="{FCA54829-69E0-4900-9165-83DAEE965D83}" dt="2023-04-16T11:22:02.680" v="89" actId="1582"/>
-          <ac:picMkLst>
-            <pc:docMk/>
-            <pc:sldMk cId="3711897289" sldId="787"/>
-            <ac:picMk id="7" creationId="{00000000-0000-0000-0000-000000000000}"/>
-          </ac:picMkLst>
-        </pc:picChg>
       </pc:sldChg>
       <pc:sldChg chg="modSp mod">
         <pc:chgData name="Gerth Stølting Brodal" userId="04ef4784-6591-4f86-a140-f5c3b108582a" providerId="ADAL" clId="{FCA54829-69E0-4900-9165-83DAEE965D83}" dt="2023-04-16T11:25:25.269" v="142" actId="1036"/>
@@ -542,46 +254,6 @@
           <pc:docMk/>
           <pc:sldMk cId="84816449" sldId="788"/>
         </pc:sldMkLst>
-        <pc:spChg chg="mod">
-          <ac:chgData name="Gerth Stølting Brodal" userId="04ef4784-6591-4f86-a140-f5c3b108582a" providerId="ADAL" clId="{FCA54829-69E0-4900-9165-83DAEE965D83}" dt="2023-04-16T11:25:03.041" v="125" actId="1035"/>
-          <ac:spMkLst>
-            <pc:docMk/>
-            <pc:sldMk cId="84816449" sldId="788"/>
-            <ac:spMk id="10" creationId="{00000000-0000-0000-0000-000000000000}"/>
-          </ac:spMkLst>
-        </pc:spChg>
-        <pc:spChg chg="mod">
-          <ac:chgData name="Gerth Stølting Brodal" userId="04ef4784-6591-4f86-a140-f5c3b108582a" providerId="ADAL" clId="{FCA54829-69E0-4900-9165-83DAEE965D83}" dt="2023-04-16T11:25:25.269" v="142" actId="1036"/>
-          <ac:spMkLst>
-            <pc:docMk/>
-            <pc:sldMk cId="84816449" sldId="788"/>
-            <ac:spMk id="11" creationId="{00000000-0000-0000-0000-000000000000}"/>
-          </ac:spMkLst>
-        </pc:spChg>
-        <pc:spChg chg="mod">
-          <ac:chgData name="Gerth Stølting Brodal" userId="04ef4784-6591-4f86-a140-f5c3b108582a" providerId="ADAL" clId="{FCA54829-69E0-4900-9165-83DAEE965D83}" dt="2023-04-16T11:25:06.560" v="132" actId="1035"/>
-          <ac:spMkLst>
-            <pc:docMk/>
-            <pc:sldMk cId="84816449" sldId="788"/>
-            <ac:spMk id="12" creationId="{00000000-0000-0000-0000-000000000000}"/>
-          </ac:spMkLst>
-        </pc:spChg>
-        <pc:spChg chg="mod">
-          <ac:chgData name="Gerth Stølting Brodal" userId="04ef4784-6591-4f86-a140-f5c3b108582a" providerId="ADAL" clId="{FCA54829-69E0-4900-9165-83DAEE965D83}" dt="2023-04-16T11:25:15.144" v="138" actId="1038"/>
-          <ac:spMkLst>
-            <pc:docMk/>
-            <pc:sldMk cId="84816449" sldId="788"/>
-            <ac:spMk id="13" creationId="{00000000-0000-0000-0000-000000000000}"/>
-          </ac:spMkLst>
-        </pc:spChg>
-        <pc:picChg chg="mod">
-          <ac:chgData name="Gerth Stølting Brodal" userId="04ef4784-6591-4f86-a140-f5c3b108582a" providerId="ADAL" clId="{FCA54829-69E0-4900-9165-83DAEE965D83}" dt="2023-04-16T11:25:12.225" v="133" actId="1076"/>
-          <ac:picMkLst>
-            <pc:docMk/>
-            <pc:sldMk cId="84816449" sldId="788"/>
-            <ac:picMk id="9" creationId="{00000000-0000-0000-0000-000000000000}"/>
-          </ac:picMkLst>
-        </pc:picChg>
       </pc:sldChg>
       <pc:sldChg chg="addSp delSp modSp mod">
         <pc:chgData name="Gerth Stølting Brodal" userId="04ef4784-6591-4f86-a140-f5c3b108582a" providerId="ADAL" clId="{FCA54829-69E0-4900-9165-83DAEE965D83}" dt="2023-04-16T11:27:37.358" v="182" actId="1076"/>
@@ -589,78 +261,6 @@
           <pc:docMk/>
           <pc:sldMk cId="2230500912" sldId="790"/>
         </pc:sldMkLst>
-        <pc:spChg chg="mod">
-          <ac:chgData name="Gerth Stølting Brodal" userId="04ef4784-6591-4f86-a140-f5c3b108582a" providerId="ADAL" clId="{FCA54829-69E0-4900-9165-83DAEE965D83}" dt="2023-04-16T11:27:26.368" v="180"/>
-          <ac:spMkLst>
-            <pc:docMk/>
-            <pc:sldMk cId="2230500912" sldId="790"/>
-            <ac:spMk id="7" creationId="{4054B121-FE17-B4F3-9BB2-59AB811B7FE5}"/>
-          </ac:spMkLst>
-        </pc:spChg>
-        <pc:spChg chg="mod">
-          <ac:chgData name="Gerth Stølting Brodal" userId="04ef4784-6591-4f86-a140-f5c3b108582a" providerId="ADAL" clId="{FCA54829-69E0-4900-9165-83DAEE965D83}" dt="2023-04-16T11:27:26.368" v="180"/>
-          <ac:spMkLst>
-            <pc:docMk/>
-            <pc:sldMk cId="2230500912" sldId="790"/>
-            <ac:spMk id="8" creationId="{89BEE1D6-D1FB-CADA-7244-ABBB13396B35}"/>
-          </ac:spMkLst>
-        </pc:spChg>
-        <pc:spChg chg="mod">
-          <ac:chgData name="Gerth Stølting Brodal" userId="04ef4784-6591-4f86-a140-f5c3b108582a" providerId="ADAL" clId="{FCA54829-69E0-4900-9165-83DAEE965D83}" dt="2023-04-16T11:27:26.368" v="180"/>
-          <ac:spMkLst>
-            <pc:docMk/>
-            <pc:sldMk cId="2230500912" sldId="790"/>
-            <ac:spMk id="9" creationId="{4F06DBE9-9B66-6D70-58DB-58B08472D26B}"/>
-          </ac:spMkLst>
-        </pc:spChg>
-        <pc:spChg chg="mod">
-          <ac:chgData name="Gerth Stølting Brodal" userId="04ef4784-6591-4f86-a140-f5c3b108582a" providerId="ADAL" clId="{FCA54829-69E0-4900-9165-83DAEE965D83}" dt="2023-04-16T11:27:26.368" v="180"/>
-          <ac:spMkLst>
-            <pc:docMk/>
-            <pc:sldMk cId="2230500912" sldId="790"/>
-            <ac:spMk id="10" creationId="{3D440628-2F70-C7D2-FD8D-2C59A9701E37}"/>
-          </ac:spMkLst>
-        </pc:spChg>
-        <pc:spChg chg="mod">
-          <ac:chgData name="Gerth Stølting Brodal" userId="04ef4784-6591-4f86-a140-f5c3b108582a" providerId="ADAL" clId="{FCA54829-69E0-4900-9165-83DAEE965D83}" dt="2023-04-16T11:27:26.368" v="180"/>
-          <ac:spMkLst>
-            <pc:docMk/>
-            <pc:sldMk cId="2230500912" sldId="790"/>
-            <ac:spMk id="11" creationId="{64065DF7-2EF0-D0B5-1E06-47124744711A}"/>
-          </ac:spMkLst>
-        </pc:spChg>
-        <pc:spChg chg="mod">
-          <ac:chgData name="Gerth Stølting Brodal" userId="04ef4784-6591-4f86-a140-f5c3b108582a" providerId="ADAL" clId="{FCA54829-69E0-4900-9165-83DAEE965D83}" dt="2023-04-16T11:27:26.368" v="180"/>
-          <ac:spMkLst>
-            <pc:docMk/>
-            <pc:sldMk cId="2230500912" sldId="790"/>
-            <ac:spMk id="12" creationId="{09C7FFDC-E655-4832-178B-226F472F1DC9}"/>
-          </ac:spMkLst>
-        </pc:spChg>
-        <pc:grpChg chg="add mod">
-          <ac:chgData name="Gerth Stølting Brodal" userId="04ef4784-6591-4f86-a140-f5c3b108582a" providerId="ADAL" clId="{FCA54829-69E0-4900-9165-83DAEE965D83}" dt="2023-04-16T11:27:37.358" v="182" actId="1076"/>
-          <ac:grpSpMkLst>
-            <pc:docMk/>
-            <pc:sldMk cId="2230500912" sldId="790"/>
-            <ac:grpSpMk id="3" creationId="{216E890D-4B46-E3A8-3B50-0B7A023EF54F}"/>
-          </ac:grpSpMkLst>
-        </pc:grpChg>
-        <pc:picChg chg="mod">
-          <ac:chgData name="Gerth Stølting Brodal" userId="04ef4784-6591-4f86-a140-f5c3b108582a" providerId="ADAL" clId="{FCA54829-69E0-4900-9165-83DAEE965D83}" dt="2023-04-16T11:27:31.294" v="181" actId="2085"/>
-          <ac:picMkLst>
-            <pc:docMk/>
-            <pc:sldMk cId="2230500912" sldId="790"/>
-            <ac:picMk id="4" creationId="{2F65F058-B34F-30BD-7C07-66D74F638E27}"/>
-          </ac:picMkLst>
-        </pc:picChg>
-        <pc:picChg chg="del">
-          <ac:chgData name="Gerth Stølting Brodal" userId="04ef4784-6591-4f86-a140-f5c3b108582a" providerId="ADAL" clId="{FCA54829-69E0-4900-9165-83DAEE965D83}" dt="2023-04-16T11:27:21.054" v="179" actId="478"/>
-          <ac:picMkLst>
-            <pc:docMk/>
-            <pc:sldMk cId="2230500912" sldId="790"/>
-            <ac:picMk id="6" creationId="{00000000-0000-0000-0000-000000000000}"/>
-          </ac:picMkLst>
-        </pc:picChg>
       </pc:sldChg>
       <pc:sldChg chg="addSp delSp modSp mod">
         <pc:chgData name="Gerth Stølting Brodal" userId="04ef4784-6591-4f86-a140-f5c3b108582a" providerId="ADAL" clId="{FCA54829-69E0-4900-9165-83DAEE965D83}" dt="2023-04-16T11:26:26.211" v="165" actId="1038"/>
@@ -668,78 +268,6 @@
           <pc:docMk/>
           <pc:sldMk cId="1989879142" sldId="792"/>
         </pc:sldMkLst>
-        <pc:spChg chg="mod">
-          <ac:chgData name="Gerth Stølting Brodal" userId="04ef4784-6591-4f86-a140-f5c3b108582a" providerId="ADAL" clId="{FCA54829-69E0-4900-9165-83DAEE965D83}" dt="2023-04-16T11:26:17.964" v="155" actId="1035"/>
-          <ac:spMkLst>
-            <pc:docMk/>
-            <pc:sldMk cId="1989879142" sldId="792"/>
-            <ac:spMk id="14" creationId="{A5E910A7-655B-7BA3-33EB-717DAA3ED4F1}"/>
-          </ac:spMkLst>
-        </pc:spChg>
-        <pc:spChg chg="mod">
-          <ac:chgData name="Gerth Stølting Brodal" userId="04ef4784-6591-4f86-a140-f5c3b108582a" providerId="ADAL" clId="{FCA54829-69E0-4900-9165-83DAEE965D83}" dt="2023-04-16T11:22:17.957" v="90"/>
-          <ac:spMkLst>
-            <pc:docMk/>
-            <pc:sldMk cId="1989879142" sldId="792"/>
-            <ac:spMk id="15" creationId="{88C4F0B9-6C44-D81C-B2F7-DC74B7005549}"/>
-          </ac:spMkLst>
-        </pc:spChg>
-        <pc:spChg chg="mod">
-          <ac:chgData name="Gerth Stølting Brodal" userId="04ef4784-6591-4f86-a140-f5c3b108582a" providerId="ADAL" clId="{FCA54829-69E0-4900-9165-83DAEE965D83}" dt="2023-04-16T11:26:23.630" v="160" actId="1035"/>
-          <ac:spMkLst>
-            <pc:docMk/>
-            <pc:sldMk cId="1989879142" sldId="792"/>
-            <ac:spMk id="16" creationId="{AF4CE2ED-D98C-BF4A-919E-D7C8A1D0B484}"/>
-          </ac:spMkLst>
-        </pc:spChg>
-        <pc:spChg chg="mod">
-          <ac:chgData name="Gerth Stølting Brodal" userId="04ef4784-6591-4f86-a140-f5c3b108582a" providerId="ADAL" clId="{FCA54829-69E0-4900-9165-83DAEE965D83}" dt="2023-04-16T11:26:26.211" v="165" actId="1038"/>
-          <ac:spMkLst>
-            <pc:docMk/>
-            <pc:sldMk cId="1989879142" sldId="792"/>
-            <ac:spMk id="17" creationId="{67AA8A20-D900-7E34-8517-745072F495B9}"/>
-          </ac:spMkLst>
-        </pc:spChg>
-        <pc:spChg chg="mod">
-          <ac:chgData name="Gerth Stølting Brodal" userId="04ef4784-6591-4f86-a140-f5c3b108582a" providerId="ADAL" clId="{FCA54829-69E0-4900-9165-83DAEE965D83}" dt="2023-04-16T11:22:17.957" v="90"/>
-          <ac:spMkLst>
-            <pc:docMk/>
-            <pc:sldMk cId="1989879142" sldId="792"/>
-            <ac:spMk id="18" creationId="{2BD67874-C0FE-4495-BEC4-401DBE7DDE6F}"/>
-          </ac:spMkLst>
-        </pc:spChg>
-        <pc:spChg chg="mod">
-          <ac:chgData name="Gerth Stølting Brodal" userId="04ef4784-6591-4f86-a140-f5c3b108582a" providerId="ADAL" clId="{FCA54829-69E0-4900-9165-83DAEE965D83}" dt="2023-04-16T11:22:17.957" v="90"/>
-          <ac:spMkLst>
-            <pc:docMk/>
-            <pc:sldMk cId="1989879142" sldId="792"/>
-            <ac:spMk id="19" creationId="{9C78F2AE-E081-AFE0-1F0F-A10E6538B3B7}"/>
-          </ac:spMkLst>
-        </pc:spChg>
-        <pc:grpChg chg="add mod">
-          <ac:chgData name="Gerth Stølting Brodal" userId="04ef4784-6591-4f86-a140-f5c3b108582a" providerId="ADAL" clId="{FCA54829-69E0-4900-9165-83DAEE965D83}" dt="2023-04-16T11:23:07.075" v="100" actId="14100"/>
-          <ac:grpSpMkLst>
-            <pc:docMk/>
-            <pc:sldMk cId="1989879142" sldId="792"/>
-            <ac:grpSpMk id="2" creationId="{73BDD816-BFB6-D183-812C-2770D5B6C160}"/>
-          </ac:grpSpMkLst>
-        </pc:grpChg>
-        <pc:grpChg chg="del">
-          <ac:chgData name="Gerth Stølting Brodal" userId="04ef4784-6591-4f86-a140-f5c3b108582a" providerId="ADAL" clId="{FCA54829-69E0-4900-9165-83DAEE965D83}" dt="2023-04-16T11:22:22.888" v="92" actId="478"/>
-          <ac:grpSpMkLst>
-            <pc:docMk/>
-            <pc:sldMk cId="1989879142" sldId="792"/>
-            <ac:grpSpMk id="4" creationId="{00000000-0000-0000-0000-000000000000}"/>
-          </ac:grpSpMkLst>
-        </pc:grpChg>
-        <pc:picChg chg="mod">
-          <ac:chgData name="Gerth Stølting Brodal" userId="04ef4784-6591-4f86-a140-f5c3b108582a" providerId="ADAL" clId="{FCA54829-69E0-4900-9165-83DAEE965D83}" dt="2023-04-16T11:26:08.795" v="148" actId="14100"/>
-          <ac:picMkLst>
-            <pc:docMk/>
-            <pc:sldMk cId="1989879142" sldId="792"/>
-            <ac:picMk id="13" creationId="{1896583B-FBA5-149C-5CB8-61202017A627}"/>
-          </ac:picMkLst>
-        </pc:picChg>
       </pc:sldChg>
       <pc:sldChg chg="modSp mod">
         <pc:chgData name="Gerth Stølting Brodal" userId="04ef4784-6591-4f86-a140-f5c3b108582a" providerId="ADAL" clId="{FCA54829-69E0-4900-9165-83DAEE965D83}" dt="2023-04-16T11:40:25.237" v="198" actId="20577"/>
@@ -747,14 +275,6 @@
           <pc:docMk/>
           <pc:sldMk cId="3092077248" sldId="796"/>
         </pc:sldMkLst>
-        <pc:graphicFrameChg chg="modGraphic">
-          <ac:chgData name="Gerth Stølting Brodal" userId="04ef4784-6591-4f86-a140-f5c3b108582a" providerId="ADAL" clId="{FCA54829-69E0-4900-9165-83DAEE965D83}" dt="2023-04-16T11:40:25.237" v="198" actId="20577"/>
-          <ac:graphicFrameMkLst>
-            <pc:docMk/>
-            <pc:sldMk cId="3092077248" sldId="796"/>
-            <ac:graphicFrameMk id="8" creationId="{00000000-0000-0000-0000-000000000000}"/>
-          </ac:graphicFrameMkLst>
-        </pc:graphicFrameChg>
       </pc:sldChg>
     </pc:docChg>
   </pc:docChgLst>
@@ -771,22 +291,6 @@
           <pc:docMk/>
           <pc:sldMk cId="2655291698" sldId="776"/>
         </pc:sldMkLst>
-        <pc:spChg chg="mod">
-          <ac:chgData name="Gerth Stølting Brodal" userId="04ef4784-6591-4f86-a140-f5c3b108582a" providerId="ADAL" clId="{3182D9E5-9F75-4E9E-A6C8-86AC2F6C117C}" dt="2024-04-10T06:02:57.681" v="113" actId="27636"/>
-          <ac:spMkLst>
-            <pc:docMk/>
-            <pc:sldMk cId="2655291698" sldId="776"/>
-            <ac:spMk id="8" creationId="{00000000-0000-0000-0000-000000000000}"/>
-          </ac:spMkLst>
-        </pc:spChg>
-        <pc:picChg chg="mod">
-          <ac:chgData name="Gerth Stølting Brodal" userId="04ef4784-6591-4f86-a140-f5c3b108582a" providerId="ADAL" clId="{3182D9E5-9F75-4E9E-A6C8-86AC2F6C117C}" dt="2024-04-10T06:03:01.611" v="114" actId="1076"/>
-          <ac:picMkLst>
-            <pc:docMk/>
-            <pc:sldMk cId="2655291698" sldId="776"/>
-            <ac:picMk id="6" creationId="{00000000-0000-0000-0000-000000000000}"/>
-          </ac:picMkLst>
-        </pc:picChg>
       </pc:sldChg>
       <pc:sldChg chg="modNotesTx">
         <pc:chgData name="Gerth Stølting Brodal" userId="04ef4784-6591-4f86-a140-f5c3b108582a" providerId="ADAL" clId="{3182D9E5-9F75-4E9E-A6C8-86AC2F6C117C}" dt="2024-04-10T06:19:07.264" v="190" actId="6549"/>
@@ -808,6 +312,30 @@
           <pc:docMk/>
           <pc:sldMk cId="3092077248" sldId="796"/>
         </pc:sldMkLst>
+      </pc:sldChg>
+    </pc:docChg>
+  </pc:docChgLst>
+  <pc:docChgLst>
+    <pc:chgData name="Gerth Stølting Brodal" userId="04ef4784-6591-4f86-a140-f5c3b108582a" providerId="ADAL" clId="{81AC35D5-6BEF-4A15-80CA-88A8229CCE5F}"/>
+    <pc:docChg chg="undo custSel modSld">
+      <pc:chgData name="Gerth Stølting Brodal" userId="04ef4784-6591-4f86-a140-f5c3b108582a" providerId="ADAL" clId="{81AC35D5-6BEF-4A15-80CA-88A8229CCE5F}" dt="2025-06-03T16:03:24.052" v="53" actId="20577"/>
+      <pc:docMkLst>
+        <pc:docMk/>
+      </pc:docMkLst>
+      <pc:sldChg chg="modSp mod modNotesTx">
+        <pc:chgData name="Gerth Stølting Brodal" userId="04ef4784-6591-4f86-a140-f5c3b108582a" providerId="ADAL" clId="{81AC35D5-6BEF-4A15-80CA-88A8229CCE5F}" dt="2025-06-03T16:03:24.052" v="53" actId="20577"/>
+        <pc:sldMkLst>
+          <pc:docMk/>
+          <pc:sldMk cId="3278452034" sldId="772"/>
+        </pc:sldMkLst>
+        <pc:spChg chg="mod">
+          <ac:chgData name="Gerth Stølting Brodal" userId="04ef4784-6591-4f86-a140-f5c3b108582a" providerId="ADAL" clId="{81AC35D5-6BEF-4A15-80CA-88A8229CCE5F}" dt="2025-06-03T16:02:43.885" v="16" actId="207"/>
+          <ac:spMkLst>
+            <pc:docMk/>
+            <pc:sldMk cId="3278452034" sldId="772"/>
+            <ac:spMk id="4" creationId="{00000000-0000-0000-0000-000000000000}"/>
+          </ac:spMkLst>
+        </pc:spChg>
       </pc:sldChg>
     </pc:docChg>
   </pc:docChgLst>
@@ -896,7 +424,7 @@
           <a:p>
             <a:fld id="{FB1A172F-81D4-4DC4-9113-1DBD56EC3646}" type="datetimeFigureOut">
               <a:rPr lang="en-US" smtClean="0"/>
-              <a:t>4/14/2024</a:t>
+              <a:t>6/3/2025</a:t>
             </a:fld>
             <a:endParaRPr lang="en-US"/>
           </a:p>
@@ -1871,6 +1399,20 @@
               <a:rPr lang="en-US" dirty="0"/>
               <a:t> are used in other courses on the Data Science education.</a:t>
             </a:r>
+          </a:p>
+          <a:p>
+            <a:r>
+              <a:rPr lang="en-US" dirty="0" err="1"/>
+              <a:t>Gurobi</a:t>
+            </a:r>
+            <a:r>
+              <a:rPr lang="en-US" dirty="0"/>
+              <a:t> has free </a:t>
+            </a:r>
+            <a:r>
+              <a:rPr lang="en-US"/>
+              <a:t>academic licenses.</a:t>
+            </a:r>
             <a:endParaRPr lang="da-DK" dirty="0"/>
           </a:p>
         </p:txBody>
@@ -2158,7 +1700,7 @@
           <a:p>
             <a:fld id="{0560A9CD-0304-4E0B-9E82-E7E0115DE05B}" type="datetimeFigureOut">
               <a:rPr lang="en-US" smtClean="0"/>
-              <a:t>4/14/2024</a:t>
+              <a:t>6/3/2025</a:t>
             </a:fld>
             <a:endParaRPr lang="en-US"/>
           </a:p>
@@ -2326,7 +1868,7 @@
           <a:p>
             <a:fld id="{0560A9CD-0304-4E0B-9E82-E7E0115DE05B}" type="datetimeFigureOut">
               <a:rPr lang="en-US" smtClean="0"/>
-              <a:t>4/14/2024</a:t>
+              <a:t>6/3/2025</a:t>
             </a:fld>
             <a:endParaRPr lang="en-US"/>
           </a:p>
@@ -2504,7 +2046,7 @@
           <a:p>
             <a:fld id="{0560A9CD-0304-4E0B-9E82-E7E0115DE05B}" type="datetimeFigureOut">
               <a:rPr lang="en-US" smtClean="0"/>
-              <a:t>4/14/2024</a:t>
+              <a:t>6/3/2025</a:t>
             </a:fld>
             <a:endParaRPr lang="en-US"/>
           </a:p>
@@ -2687,7 +2229,7 @@
           <a:p>
             <a:fld id="{0560A9CD-0304-4E0B-9E82-E7E0115DE05B}" type="datetimeFigureOut">
               <a:rPr lang="en-US" smtClean="0"/>
-              <a:t>4/14/2024</a:t>
+              <a:t>6/3/2025</a:t>
             </a:fld>
             <a:endParaRPr lang="en-US"/>
           </a:p>
@@ -2932,7 +2474,7 @@
           <a:p>
             <a:fld id="{0560A9CD-0304-4E0B-9E82-E7E0115DE05B}" type="datetimeFigureOut">
               <a:rPr lang="en-US" smtClean="0"/>
-              <a:t>4/14/2024</a:t>
+              <a:t>6/3/2025</a:t>
             </a:fld>
             <a:endParaRPr lang="en-US"/>
           </a:p>
@@ -3161,7 +2703,7 @@
           <a:p>
             <a:fld id="{0560A9CD-0304-4E0B-9E82-E7E0115DE05B}" type="datetimeFigureOut">
               <a:rPr lang="en-US" smtClean="0"/>
-              <a:t>4/14/2024</a:t>
+              <a:t>6/3/2025</a:t>
             </a:fld>
             <a:endParaRPr lang="en-US"/>
           </a:p>
@@ -3525,7 +3067,7 @@
           <a:p>
             <a:fld id="{0560A9CD-0304-4E0B-9E82-E7E0115DE05B}" type="datetimeFigureOut">
               <a:rPr lang="en-US" smtClean="0"/>
-              <a:t>4/14/2024</a:t>
+              <a:t>6/3/2025</a:t>
             </a:fld>
             <a:endParaRPr lang="en-US"/>
           </a:p>
@@ -3642,7 +3184,7 @@
           <a:p>
             <a:fld id="{0560A9CD-0304-4E0B-9E82-E7E0115DE05B}" type="datetimeFigureOut">
               <a:rPr lang="en-US" smtClean="0"/>
-              <a:t>4/14/2024</a:t>
+              <a:t>6/3/2025</a:t>
             </a:fld>
             <a:endParaRPr lang="en-US"/>
           </a:p>
@@ -3737,7 +3279,7 @@
           <a:p>
             <a:fld id="{0560A9CD-0304-4E0B-9E82-E7E0115DE05B}" type="datetimeFigureOut">
               <a:rPr lang="en-US" smtClean="0"/>
-              <a:t>4/14/2024</a:t>
+              <a:t>6/3/2025</a:t>
             </a:fld>
             <a:endParaRPr lang="en-US"/>
           </a:p>
@@ -4012,7 +3554,7 @@
           <a:p>
             <a:fld id="{0560A9CD-0304-4E0B-9E82-E7E0115DE05B}" type="datetimeFigureOut">
               <a:rPr lang="en-US" smtClean="0"/>
-              <a:t>4/14/2024</a:t>
+              <a:t>6/3/2025</a:t>
             </a:fld>
             <a:endParaRPr lang="en-US"/>
           </a:p>
@@ -4264,7 +3806,7 @@
           <a:p>
             <a:fld id="{0560A9CD-0304-4E0B-9E82-E7E0115DE05B}" type="datetimeFigureOut">
               <a:rPr lang="en-US" smtClean="0"/>
-              <a:t>4/14/2024</a:t>
+              <a:t>6/3/2025</a:t>
             </a:fld>
             <a:endParaRPr lang="en-US"/>
           </a:p>
@@ -4475,7 +4017,7 @@
           <a:p>
             <a:fld id="{0560A9CD-0304-4E0B-9E82-E7E0115DE05B}" type="datetimeFigureOut">
               <a:rPr lang="en-US" smtClean="0"/>
-              <a:t>4/14/2024</a:t>
+              <a:t>6/3/2025</a:t>
             </a:fld>
             <a:endParaRPr lang="en-US"/>
           </a:p>
@@ -12119,8 +11661,8 @@
         </p:nvSpPr>
         <p:spPr>
           <a:xfrm>
-            <a:off x="3956613" y="6169709"/>
-            <a:ext cx="8235387" cy="646331"/>
+            <a:off x="2425701" y="6169709"/>
+            <a:ext cx="9766300" cy="646331"/>
           </a:xfrm>
           <a:prstGeom prst="rect">
             <a:avLst/>
@@ -12135,16 +11677,6 @@
           <a:p>
             <a:pPr algn="r"/>
             <a:r>
-              <a:rPr lang="en-US">
-                <a:solidFill>
-                  <a:schemeClr val="bg1">
-                    <a:lumMod val="50000"/>
-                  </a:schemeClr>
-                </a:solidFill>
-              </a:rPr>
-              <a:t>Some other </a:t>
-            </a:r>
-            <a:r>
               <a:rPr lang="en-US" dirty="0">
                 <a:solidFill>
                   <a:schemeClr val="bg1">
@@ -12152,7 +11684,7 @@
                   </a:schemeClr>
                 </a:solidFill>
               </a:rPr>
-              <a:t>open-source optimization libraries </a:t>
+              <a:t>Some other open-source optimization libraries </a:t>
             </a:r>
             <a:r>
               <a:rPr lang="en-US" dirty="0" err="1">
@@ -12161,7 +11693,13 @@
                     <a:lumMod val="50000"/>
                   </a:schemeClr>
                 </a:solidFill>
-                <a:hlinkClick r:id="rId3"/>
+                <a:hlinkClick r:id="rId3">
+                  <a:extLst>
+                    <a:ext uri="{A12FA001-AC4F-418D-AE19-62706E023703}">
+                      <ahyp:hlinkClr xmlns:ahyp="http://schemas.microsoft.com/office/drawing/2018/hyperlinkcolor" val="tx"/>
+                    </a:ext>
+                  </a:extLst>
+                </a:hlinkClick>
               </a:rPr>
               <a:t>PuLP</a:t>
             </a:r>
@@ -12182,7 +11720,13 @@
                     <a:lumMod val="50000"/>
                   </a:schemeClr>
                 </a:solidFill>
-                <a:hlinkClick r:id="rId4"/>
+                <a:hlinkClick r:id="rId4">
+                  <a:extLst>
+                    <a:ext uri="{A12FA001-AC4F-418D-AE19-62706E023703}">
+                      <ahyp:hlinkClr xmlns:ahyp="http://schemas.microsoft.com/office/drawing/2018/hyperlinkcolor" val="tx"/>
+                    </a:ext>
+                  </a:extLst>
+                </a:hlinkClick>
               </a:rPr>
               <a:t>Pyomo</a:t>
             </a:r>
@@ -12213,7 +11757,13 @@
                     <a:lumMod val="50000"/>
                   </a:schemeClr>
                 </a:solidFill>
-                <a:hlinkClick r:id="rId5"/>
+                <a:hlinkClick r:id="rId5">
+                  <a:extLst>
+                    <a:ext uri="{A12FA001-AC4F-418D-AE19-62706E023703}">
+                      <ahyp:hlinkClr xmlns:ahyp="http://schemas.microsoft.com/office/drawing/2018/hyperlinkcolor" val="tx"/>
+                    </a:ext>
+                  </a:extLst>
+                </a:hlinkClick>
               </a:rPr>
               <a:t>Cplex</a:t>
             </a:r>
@@ -12234,7 +11784,13 @@
                     <a:lumMod val="50000"/>
                   </a:schemeClr>
                 </a:solidFill>
-                <a:hlinkClick r:id="rId6"/>
+                <a:hlinkClick r:id="rId6">
+                  <a:extLst>
+                    <a:ext uri="{A12FA001-AC4F-418D-AE19-62706E023703}">
+                      <ahyp:hlinkClr xmlns:ahyp="http://schemas.microsoft.com/office/drawing/2018/hyperlinkcolor" val="tx"/>
+                    </a:ext>
+                  </a:extLst>
+                </a:hlinkClick>
               </a:rPr>
               <a:t>Gurobi</a:t>
             </a:r>
@@ -12246,7 +11802,7 @@
                   </a:schemeClr>
                 </a:solidFill>
               </a:rPr>
-              <a:t> </a:t>
+              <a:t> (Mixed-Integer Linear Programs) </a:t>
             </a:r>
           </a:p>
         </p:txBody>

</xml_diff>